<commit_message>
fix how to use
</commit_message>
<xml_diff>
--- a/how-to-use.pptx
+++ b/how-to-use.pptx
@@ -5,16 +5,21 @@
     <p:sldMasterId id="2147484582" r:id="rId1"/>
   </p:sldMasterIdLst>
   <p:notesMasterIdLst>
-    <p:notesMasterId r:id="rId6"/>
+    <p:notesMasterId r:id="rId11"/>
   </p:notesMasterIdLst>
   <p:handoutMasterIdLst>
-    <p:handoutMasterId r:id="rId7"/>
+    <p:handoutMasterId r:id="rId12"/>
   </p:handoutMasterIdLst>
   <p:sldIdLst>
     <p:sldId id="388" r:id="rId2"/>
     <p:sldId id="10841" r:id="rId3"/>
     <p:sldId id="10842" r:id="rId4"/>
-    <p:sldId id="10843" r:id="rId5"/>
+    <p:sldId id="10847" r:id="rId5"/>
+    <p:sldId id="10843" r:id="rId6"/>
+    <p:sldId id="10844" r:id="rId7"/>
+    <p:sldId id="10848" r:id="rId8"/>
+    <p:sldId id="10846" r:id="rId9"/>
+    <p:sldId id="10845" r:id="rId10"/>
   </p:sldIdLst>
   <p:sldSz cx="12436475" cy="6994525"/>
   <p:notesSz cx="6807200" cy="9939338"/>
@@ -239,7 +244,7 @@
               <a:rPr lang="en-US" smtClean="0">
                 <a:latin typeface="Segoe UI" pitchFamily="34" charset="0"/>
               </a:rPr>
-              <a:t>4/10/20 7:16 PM</a:t>
+              <a:t>4/10/20 7:35 PM</a:t>
             </a:fld>
             <a:endParaRPr lang="en-US">
               <a:latin typeface="Segoe UI" pitchFamily="34" charset="0"/>
@@ -517,7 +522,7 @@
           <a:p>
             <a:fld id="{64CFA94A-519F-445C-B30C-9E76FA6A2031}" type="datetime8">
               <a:rPr lang="en-US" smtClean="0"/>
-              <a:t>4/10/20 7:16 PM</a:t>
+              <a:t>4/10/20 7:35 PM</a:t>
             </a:fld>
             <a:endParaRPr lang="en-US"/>
           </a:p>
@@ -884,7 +889,7 @@
           <a:p>
             <a:fld id="{64CFA94A-519F-445C-B30C-9E76FA6A2031}" type="datetime8">
               <a:rPr lang="en-US" smtClean="0"/>
-              <a:t>4/10/20 7:16 PM</a:t>
+              <a:t>4/10/20 7:35 PM</a:t>
             </a:fld>
             <a:endParaRPr lang="en-US"/>
           </a:p>
@@ -1071,7 +1076,7 @@
           <a:p>
             <a:fld id="{64CFA94A-519F-445C-B30C-9E76FA6A2031}" type="datetime8">
               <a:rPr lang="en-US" smtClean="0"/>
-              <a:t>4/10/20 7:22 PM</a:t>
+              <a:t>4/10/20 10:07 PM</a:t>
             </a:fld>
             <a:endParaRPr lang="en-US"/>
           </a:p>
@@ -1159,8 +1164,12 @@
           <a:lstStyle/>
           <a:p>
             <a:r>
+              <a:rPr kumimoji="1" lang="en-US" altLang="ja-JP" dirty="0"/>
+              <a:t>PowerPoint</a:t>
+            </a:r>
+            <a:r>
               <a:rPr kumimoji="1" lang="ja-JP" altLang="en-US"/>
-              <a:t>各スライドのページで話したい内容を、ノートに記載します。</a:t>
+              <a:t> で各スライドのページで話したい内容を、ノートに記載します。</a:t>
             </a:r>
             <a:endParaRPr kumimoji="1" lang="en-US" altLang="ja-JP" dirty="0"/>
           </a:p>
@@ -1257,7 +1266,7 @@
           <a:p>
             <a:fld id="{64CFA94A-519F-445C-B30C-9E76FA6A2031}" type="datetime8">
               <a:rPr lang="en-US" smtClean="0"/>
-              <a:t>4/10/20 7:27 PM</a:t>
+              <a:t>4/10/20 7:35 PM</a:t>
             </a:fld>
             <a:endParaRPr lang="en-US"/>
           </a:p>
@@ -1381,9 +1390,9 @@
           <a:p>
             <a:r>
               <a:rPr kumimoji="1" lang="ja-JP" altLang="en-US"/>
-              <a:t>・動画ファイル</a:t>
-            </a:r>
-            <a:endParaRPr kumimoji="1" lang="en-US" altLang="ja-JP"/>
+              <a:t>生成された動画ファイルはパワーポイントと同じフォルダに出力されます。</a:t>
+            </a:r>
+            <a:endParaRPr kumimoji="1" lang="en-US" altLang="ja-JP" dirty="0"/>
           </a:p>
           <a:p>
             <a:endParaRPr kumimoji="1" lang="en-US" altLang="ja-JP" dirty="0"/>
@@ -1467,7 +1476,7 @@
           <a:p>
             <a:fld id="{64CFA94A-519F-445C-B30C-9E76FA6A2031}" type="datetime8">
               <a:rPr lang="en-US" smtClean="0"/>
-              <a:t>4/10/20 7:30 PM</a:t>
+              <a:t>4/10/20 7:35 PM</a:t>
             </a:fld>
             <a:endParaRPr lang="en-US"/>
           </a:p>
@@ -1491,7 +1500,7 @@
             <a:fld id="{B4008EB6-D09E-4580-8CD6-DDB14511944F}" type="slidenum">
               <a:rPr lang="en-US" smtClean="0"/>
               <a:pPr/>
-              <a:t>4</a:t>
+              <a:t>5</a:t>
             </a:fld>
             <a:endParaRPr lang="en-US"/>
           </a:p>
@@ -1501,6 +1510,714 @@
     <p:extLst>
       <p:ext uri="{BB962C8B-B14F-4D97-AF65-F5344CB8AC3E}">
         <p14:creationId xmlns:p14="http://schemas.microsoft.com/office/powerpoint/2010/main" val="601291161"/>
+      </p:ext>
+    </p:extLst>
+  </p:cSld>
+  <p:clrMapOvr>
+    <a:masterClrMapping/>
+  </p:clrMapOvr>
+</p:notes>
+</file>
+
+<file path=ppt/notesSlides/notesSlide5.xml><?xml version="1.0" encoding="utf-8"?>
+<p:notes xmlns:a="http://schemas.openxmlformats.org/drawingml/2006/main" xmlns:r="http://schemas.openxmlformats.org/officeDocument/2006/relationships" xmlns:p="http://schemas.openxmlformats.org/presentationml/2006/main">
+  <p:cSld>
+    <p:spTree>
+      <p:nvGrpSpPr>
+        <p:cNvPr id="1" name=""/>
+        <p:cNvGrpSpPr/>
+        <p:nvPr/>
+      </p:nvGrpSpPr>
+      <p:grpSpPr>
+        <a:xfrm>
+          <a:off x="0" y="0"/>
+          <a:ext cx="0" cy="0"/>
+          <a:chOff x="0" y="0"/>
+          <a:chExt cx="0" cy="0"/>
+        </a:xfrm>
+      </p:grpSpPr>
+      <p:sp>
+        <p:nvSpPr>
+          <p:cNvPr id="2" name="スライド イメージ プレースホルダー 1"/>
+          <p:cNvSpPr>
+            <a:spLocks noGrp="1" noRot="1" noChangeAspect="1"/>
+          </p:cNvSpPr>
+          <p:nvPr>
+            <p:ph type="sldImg"/>
+          </p:nvPr>
+        </p:nvSpPr>
+        <p:spPr/>
+      </p:sp>
+      <p:sp>
+        <p:nvSpPr>
+          <p:cNvPr id="3" name="ノート プレースホルダー 2"/>
+          <p:cNvSpPr>
+            <a:spLocks noGrp="1"/>
+          </p:cNvSpPr>
+          <p:nvPr>
+            <p:ph type="body" idx="1"/>
+          </p:nvPr>
+        </p:nvSpPr>
+        <p:spPr/>
+        <p:txBody>
+          <a:bodyPr/>
+          <a:lstStyle/>
+          <a:p>
+            <a:r>
+              <a:rPr kumimoji="1" lang="ja-JP" altLang="en-US"/>
+              <a:t>ツール実行中の様子です。</a:t>
+            </a:r>
+            <a:endParaRPr kumimoji="1" lang="en-US" altLang="ja-JP" dirty="0"/>
+          </a:p>
+          <a:p>
+            <a:r>
+              <a:rPr kumimoji="1" lang="en-US" altLang="ja-JP" dirty="0"/>
+              <a:t>PowerPoint</a:t>
+            </a:r>
+            <a:r>
+              <a:rPr kumimoji="1" lang="ja-JP" altLang="en-US"/>
+              <a:t>　アプリケーションが起動しますが、操作したり、終了したりしないようにしてください。</a:t>
+            </a:r>
+          </a:p>
+        </p:txBody>
+      </p:sp>
+      <p:sp>
+        <p:nvSpPr>
+          <p:cNvPr id="4" name="ヘッダー プレースホルダー 3"/>
+          <p:cNvSpPr>
+            <a:spLocks noGrp="1"/>
+          </p:cNvSpPr>
+          <p:nvPr>
+            <p:ph type="hdr" sz="quarter"/>
+          </p:nvPr>
+        </p:nvSpPr>
+        <p:spPr/>
+        <p:txBody>
+          <a:bodyPr/>
+          <a:lstStyle/>
+          <a:p>
+            <a:endParaRPr lang="en-US"/>
+          </a:p>
+        </p:txBody>
+      </p:sp>
+      <p:sp>
+        <p:nvSpPr>
+          <p:cNvPr id="5" name="フッター プレースホルダー 4"/>
+          <p:cNvSpPr>
+            <a:spLocks noGrp="1"/>
+          </p:cNvSpPr>
+          <p:nvPr>
+            <p:ph type="ftr" sz="quarter" idx="4"/>
+          </p:nvPr>
+        </p:nvSpPr>
+        <p:spPr/>
+        <p:txBody>
+          <a:bodyPr/>
+          <a:lstStyle/>
+          <a:p>
+            <a:pPr defTabSz="914099" eaLnBrk="0" hangingPunct="0"/>
+            <a:r>
+              <a:rPr lang="en-US" sz="400">
+                <a:gradFill>
+                  <a:gsLst>
+                    <a:gs pos="0">
+                      <a:prstClr val="black"/>
+                    </a:gs>
+                    <a:gs pos="100000">
+                      <a:prstClr val="black"/>
+                    </a:gs>
+                  </a:gsLst>
+                  <a:lin ang="5400000" scaled="0"/>
+                </a:gradFill>
+                <a:latin typeface="Segoe UI" pitchFamily="34" charset="0"/>
+                <a:ea typeface="Segoe UI" pitchFamily="34" charset="0"/>
+                <a:cs typeface="Segoe UI" pitchFamily="34" charset="0"/>
+              </a:rPr>
+              <a:t>© 2013 Microsoft Corporation. All rights reserved. Microsoft, Windows, and other product names are or may be registered trademarks and/or trademarks in the U.S. and/or other countries. The information herein is for informational purposes only and represents the current view of Microsoft Corporation as of the date of this presentation.  Because Microsoft must respond to changing market conditions, it should not be interpreted to be a commitment on the part of Microsoft, and Microsoft cannot guarantee the accuracy of any information provided after the date of this presentation.  MICROSOFT MAKES NO WARRANTIES, EXPRESS, IMPLIED OR STATUTORY, AS TO THE INFORMATION IN THIS PRESENTATION.</a:t>
+            </a:r>
+          </a:p>
+        </p:txBody>
+      </p:sp>
+      <p:sp>
+        <p:nvSpPr>
+          <p:cNvPr id="6" name="日付プレースホルダー 5"/>
+          <p:cNvSpPr>
+            <a:spLocks noGrp="1"/>
+          </p:cNvSpPr>
+          <p:nvPr>
+            <p:ph type="dt" idx="1"/>
+          </p:nvPr>
+        </p:nvSpPr>
+        <p:spPr/>
+        <p:txBody>
+          <a:bodyPr/>
+          <a:lstStyle/>
+          <a:p>
+            <a:fld id="{64CFA94A-519F-445C-B30C-9E76FA6A2031}" type="datetime8">
+              <a:rPr lang="en-US" smtClean="0"/>
+              <a:t>4/10/20 10:04 PM</a:t>
+            </a:fld>
+            <a:endParaRPr lang="en-US"/>
+          </a:p>
+        </p:txBody>
+      </p:sp>
+      <p:sp>
+        <p:nvSpPr>
+          <p:cNvPr id="7" name="スライド番号プレースホルダー 6"/>
+          <p:cNvSpPr>
+            <a:spLocks noGrp="1"/>
+          </p:cNvSpPr>
+          <p:nvPr>
+            <p:ph type="sldNum" sz="quarter" idx="5"/>
+          </p:nvPr>
+        </p:nvSpPr>
+        <p:spPr/>
+        <p:txBody>
+          <a:bodyPr/>
+          <a:lstStyle/>
+          <a:p>
+            <a:fld id="{B4008EB6-D09E-4580-8CD6-DDB14511944F}" type="slidenum">
+              <a:rPr lang="en-US" smtClean="0"/>
+              <a:pPr/>
+              <a:t>6</a:t>
+            </a:fld>
+            <a:endParaRPr lang="en-US"/>
+          </a:p>
+        </p:txBody>
+      </p:sp>
+    </p:spTree>
+    <p:extLst>
+      <p:ext uri="{BB962C8B-B14F-4D97-AF65-F5344CB8AC3E}">
+        <p14:creationId xmlns:p14="http://schemas.microsoft.com/office/powerpoint/2010/main" val="436726258"/>
+      </p:ext>
+    </p:extLst>
+  </p:cSld>
+  <p:clrMapOvr>
+    <a:masterClrMapping/>
+  </p:clrMapOvr>
+</p:notes>
+</file>
+
+<file path=ppt/notesSlides/notesSlide6.xml><?xml version="1.0" encoding="utf-8"?>
+<p:notes xmlns:a="http://schemas.openxmlformats.org/drawingml/2006/main" xmlns:r="http://schemas.openxmlformats.org/officeDocument/2006/relationships" xmlns:p="http://schemas.openxmlformats.org/presentationml/2006/main">
+  <p:cSld>
+    <p:spTree>
+      <p:nvGrpSpPr>
+        <p:cNvPr id="1" name=""/>
+        <p:cNvGrpSpPr/>
+        <p:nvPr/>
+      </p:nvGrpSpPr>
+      <p:grpSpPr>
+        <a:xfrm>
+          <a:off x="0" y="0"/>
+          <a:ext cx="0" cy="0"/>
+          <a:chOff x="0" y="0"/>
+          <a:chExt cx="0" cy="0"/>
+        </a:xfrm>
+      </p:grpSpPr>
+      <p:sp>
+        <p:nvSpPr>
+          <p:cNvPr id="2" name="スライド イメージ プレースホルダー 1"/>
+          <p:cNvSpPr>
+            <a:spLocks noGrp="1" noRot="1" noChangeAspect="1"/>
+          </p:cNvSpPr>
+          <p:nvPr>
+            <p:ph type="sldImg"/>
+          </p:nvPr>
+        </p:nvSpPr>
+        <p:spPr/>
+      </p:sp>
+      <p:sp>
+        <p:nvSpPr>
+          <p:cNvPr id="3" name="ノート プレースホルダー 2"/>
+          <p:cNvSpPr>
+            <a:spLocks noGrp="1"/>
+          </p:cNvSpPr>
+          <p:nvPr>
+            <p:ph type="body" idx="1"/>
+          </p:nvPr>
+        </p:nvSpPr>
+        <p:spPr/>
+        <p:txBody>
+          <a:bodyPr/>
+          <a:lstStyle/>
+          <a:p>
+            <a:r>
+              <a:rPr kumimoji="1" lang="ja-JP" altLang="en-US"/>
+              <a:t>アニメーションが含まれるスライドは注意が必要です。</a:t>
+            </a:r>
+            <a:endParaRPr kumimoji="1" lang="en-US" altLang="ja-JP" dirty="0"/>
+          </a:p>
+          <a:p>
+            <a:r>
+              <a:rPr kumimoji="1" lang="ja-JP" altLang="en-US"/>
+              <a:t>合成した音声は各スライドの先頭で自動的に再生されるように設定されますが、他のアニメーションとタイミングの調整ができません。</a:t>
+            </a:r>
+            <a:endParaRPr kumimoji="1" lang="en-US" altLang="ja-JP" dirty="0"/>
+          </a:p>
+          <a:p>
+            <a:r>
+              <a:rPr kumimoji="1" lang="ja-JP" altLang="en-US"/>
+              <a:t>生成された動画ファイルを確認してタイミングがおかしい場合、中間生成されるパワーポイントを開き、アニメーションのタイミングを調整してください。</a:t>
+            </a:r>
+            <a:endParaRPr kumimoji="1" lang="en-US" altLang="ja-JP" dirty="0"/>
+          </a:p>
+          <a:p>
+            <a:r>
+              <a:rPr kumimoji="1" lang="ja-JP" altLang="en-US"/>
+              <a:t>その後、ファイルメニューからエクスポートを選択、ビデオの作成を選択してくビデオを出力してください。</a:t>
+            </a:r>
+            <a:endParaRPr kumimoji="1" lang="en-US" altLang="ja-JP" dirty="0"/>
+          </a:p>
+          <a:p>
+            <a:endParaRPr kumimoji="1" lang="ja-JP" altLang="en-US"/>
+          </a:p>
+        </p:txBody>
+      </p:sp>
+      <p:sp>
+        <p:nvSpPr>
+          <p:cNvPr id="4" name="ヘッダー プレースホルダー 3"/>
+          <p:cNvSpPr>
+            <a:spLocks noGrp="1"/>
+          </p:cNvSpPr>
+          <p:nvPr>
+            <p:ph type="hdr" sz="quarter"/>
+          </p:nvPr>
+        </p:nvSpPr>
+        <p:spPr/>
+        <p:txBody>
+          <a:bodyPr/>
+          <a:lstStyle/>
+          <a:p>
+            <a:endParaRPr lang="en-US"/>
+          </a:p>
+        </p:txBody>
+      </p:sp>
+      <p:sp>
+        <p:nvSpPr>
+          <p:cNvPr id="5" name="フッター プレースホルダー 4"/>
+          <p:cNvSpPr>
+            <a:spLocks noGrp="1"/>
+          </p:cNvSpPr>
+          <p:nvPr>
+            <p:ph type="ftr" sz="quarter" idx="4"/>
+          </p:nvPr>
+        </p:nvSpPr>
+        <p:spPr/>
+        <p:txBody>
+          <a:bodyPr/>
+          <a:lstStyle/>
+          <a:p>
+            <a:pPr defTabSz="914099" eaLnBrk="0" hangingPunct="0"/>
+            <a:r>
+              <a:rPr lang="en-US" sz="400">
+                <a:gradFill>
+                  <a:gsLst>
+                    <a:gs pos="0">
+                      <a:prstClr val="black"/>
+                    </a:gs>
+                    <a:gs pos="100000">
+                      <a:prstClr val="black"/>
+                    </a:gs>
+                  </a:gsLst>
+                  <a:lin ang="5400000" scaled="0"/>
+                </a:gradFill>
+                <a:latin typeface="Segoe UI" pitchFamily="34" charset="0"/>
+                <a:ea typeface="Segoe UI" pitchFamily="34" charset="0"/>
+                <a:cs typeface="Segoe UI" pitchFamily="34" charset="0"/>
+              </a:rPr>
+              <a:t>© 2013 Microsoft Corporation. All rights reserved. Microsoft, Windows, and other product names are or may be registered trademarks and/or trademarks in the U.S. and/or other countries. The information herein is for informational purposes only and represents the current view of Microsoft Corporation as of the date of this presentation.  Because Microsoft must respond to changing market conditions, it should not be interpreted to be a commitment on the part of Microsoft, and Microsoft cannot guarantee the accuracy of any information provided after the date of this presentation.  MICROSOFT MAKES NO WARRANTIES, EXPRESS, IMPLIED OR STATUTORY, AS TO THE INFORMATION IN THIS PRESENTATION.</a:t>
+            </a:r>
+          </a:p>
+        </p:txBody>
+      </p:sp>
+      <p:sp>
+        <p:nvSpPr>
+          <p:cNvPr id="6" name="日付プレースホルダー 5"/>
+          <p:cNvSpPr>
+            <a:spLocks noGrp="1"/>
+          </p:cNvSpPr>
+          <p:nvPr>
+            <p:ph type="dt" idx="1"/>
+          </p:nvPr>
+        </p:nvSpPr>
+        <p:spPr/>
+        <p:txBody>
+          <a:bodyPr/>
+          <a:lstStyle/>
+          <a:p>
+            <a:fld id="{64CFA94A-519F-445C-B30C-9E76FA6A2031}" type="datetime8">
+              <a:rPr lang="en-US" smtClean="0"/>
+              <a:t>4/10/20 10:24 PM</a:t>
+            </a:fld>
+            <a:endParaRPr lang="en-US"/>
+          </a:p>
+        </p:txBody>
+      </p:sp>
+      <p:sp>
+        <p:nvSpPr>
+          <p:cNvPr id="7" name="スライド番号プレースホルダー 6"/>
+          <p:cNvSpPr>
+            <a:spLocks noGrp="1"/>
+          </p:cNvSpPr>
+          <p:nvPr>
+            <p:ph type="sldNum" sz="quarter" idx="5"/>
+          </p:nvPr>
+        </p:nvSpPr>
+        <p:spPr/>
+        <p:txBody>
+          <a:bodyPr/>
+          <a:lstStyle/>
+          <a:p>
+            <a:fld id="{B4008EB6-D09E-4580-8CD6-DDB14511944F}" type="slidenum">
+              <a:rPr lang="en-US" smtClean="0"/>
+              <a:pPr/>
+              <a:t>7</a:t>
+            </a:fld>
+            <a:endParaRPr lang="en-US"/>
+          </a:p>
+        </p:txBody>
+      </p:sp>
+    </p:spTree>
+    <p:extLst>
+      <p:ext uri="{BB962C8B-B14F-4D97-AF65-F5344CB8AC3E}">
+        <p14:creationId xmlns:p14="http://schemas.microsoft.com/office/powerpoint/2010/main" val="2186481096"/>
+      </p:ext>
+    </p:extLst>
+  </p:cSld>
+  <p:clrMapOvr>
+    <a:masterClrMapping/>
+  </p:clrMapOvr>
+</p:notes>
+</file>
+
+<file path=ppt/notesSlides/notesSlide7.xml><?xml version="1.0" encoding="utf-8"?>
+<p:notes xmlns:a="http://schemas.openxmlformats.org/drawingml/2006/main" xmlns:r="http://schemas.openxmlformats.org/officeDocument/2006/relationships" xmlns:p="http://schemas.openxmlformats.org/presentationml/2006/main">
+  <p:cSld>
+    <p:spTree>
+      <p:nvGrpSpPr>
+        <p:cNvPr id="1" name=""/>
+        <p:cNvGrpSpPr/>
+        <p:nvPr/>
+      </p:nvGrpSpPr>
+      <p:grpSpPr>
+        <a:xfrm>
+          <a:off x="0" y="0"/>
+          <a:ext cx="0" cy="0"/>
+          <a:chOff x="0" y="0"/>
+          <a:chExt cx="0" cy="0"/>
+        </a:xfrm>
+      </p:grpSpPr>
+      <p:sp>
+        <p:nvSpPr>
+          <p:cNvPr id="2" name="スライド イメージ プレースホルダー 1"/>
+          <p:cNvSpPr>
+            <a:spLocks noGrp="1" noRot="1" noChangeAspect="1"/>
+          </p:cNvSpPr>
+          <p:nvPr>
+            <p:ph type="sldImg"/>
+          </p:nvPr>
+        </p:nvSpPr>
+        <p:spPr/>
+      </p:sp>
+      <p:sp>
+        <p:nvSpPr>
+          <p:cNvPr id="3" name="ノート プレースホルダー 2"/>
+          <p:cNvSpPr>
+            <a:spLocks noGrp="1"/>
+          </p:cNvSpPr>
+          <p:nvPr>
+            <p:ph type="body" idx="1"/>
+          </p:nvPr>
+        </p:nvSpPr>
+        <p:spPr/>
+        <p:txBody>
+          <a:bodyPr/>
+          <a:lstStyle/>
+          <a:p>
+            <a:r>
+              <a:rPr kumimoji="1" lang="ja-JP" altLang="en-US"/>
+              <a:t>このツールはこちらの環境で開発、動作を確認しています。</a:t>
+            </a:r>
+          </a:p>
+        </p:txBody>
+      </p:sp>
+      <p:sp>
+        <p:nvSpPr>
+          <p:cNvPr id="4" name="ヘッダー プレースホルダー 3"/>
+          <p:cNvSpPr>
+            <a:spLocks noGrp="1"/>
+          </p:cNvSpPr>
+          <p:nvPr>
+            <p:ph type="hdr" sz="quarter"/>
+          </p:nvPr>
+        </p:nvSpPr>
+        <p:spPr/>
+        <p:txBody>
+          <a:bodyPr/>
+          <a:lstStyle/>
+          <a:p>
+            <a:endParaRPr lang="en-US"/>
+          </a:p>
+        </p:txBody>
+      </p:sp>
+      <p:sp>
+        <p:nvSpPr>
+          <p:cNvPr id="5" name="フッター プレースホルダー 4"/>
+          <p:cNvSpPr>
+            <a:spLocks noGrp="1"/>
+          </p:cNvSpPr>
+          <p:nvPr>
+            <p:ph type="ftr" sz="quarter" idx="4"/>
+          </p:nvPr>
+        </p:nvSpPr>
+        <p:spPr/>
+        <p:txBody>
+          <a:bodyPr/>
+          <a:lstStyle/>
+          <a:p>
+            <a:pPr defTabSz="914099" eaLnBrk="0" hangingPunct="0"/>
+            <a:r>
+              <a:rPr lang="en-US" sz="400">
+                <a:gradFill>
+                  <a:gsLst>
+                    <a:gs pos="0">
+                      <a:prstClr val="black"/>
+                    </a:gs>
+                    <a:gs pos="100000">
+                      <a:prstClr val="black"/>
+                    </a:gs>
+                  </a:gsLst>
+                  <a:lin ang="5400000" scaled="0"/>
+                </a:gradFill>
+                <a:latin typeface="Segoe UI" pitchFamily="34" charset="0"/>
+                <a:ea typeface="Segoe UI" pitchFamily="34" charset="0"/>
+                <a:cs typeface="Segoe UI" pitchFamily="34" charset="0"/>
+              </a:rPr>
+              <a:t>© 2013 Microsoft Corporation. All rights reserved. Microsoft, Windows, and other product names are or may be registered trademarks and/or trademarks in the U.S. and/or other countries. The information herein is for informational purposes only and represents the current view of Microsoft Corporation as of the date of this presentation.  Because Microsoft must respond to changing market conditions, it should not be interpreted to be a commitment on the part of Microsoft, and Microsoft cannot guarantee the accuracy of any information provided after the date of this presentation.  MICROSOFT MAKES NO WARRANTIES, EXPRESS, IMPLIED OR STATUTORY, AS TO THE INFORMATION IN THIS PRESENTATION.</a:t>
+            </a:r>
+          </a:p>
+        </p:txBody>
+      </p:sp>
+      <p:sp>
+        <p:nvSpPr>
+          <p:cNvPr id="6" name="日付プレースホルダー 5"/>
+          <p:cNvSpPr>
+            <a:spLocks noGrp="1"/>
+          </p:cNvSpPr>
+          <p:nvPr>
+            <p:ph type="dt" idx="1"/>
+          </p:nvPr>
+        </p:nvSpPr>
+        <p:spPr/>
+        <p:txBody>
+          <a:bodyPr/>
+          <a:lstStyle/>
+          <a:p>
+            <a:fld id="{64CFA94A-519F-445C-B30C-9E76FA6A2031}" type="datetime8">
+              <a:rPr lang="en-US" smtClean="0"/>
+              <a:t>4/10/20 10:29 PM</a:t>
+            </a:fld>
+            <a:endParaRPr lang="en-US"/>
+          </a:p>
+        </p:txBody>
+      </p:sp>
+      <p:sp>
+        <p:nvSpPr>
+          <p:cNvPr id="7" name="スライド番号プレースホルダー 6"/>
+          <p:cNvSpPr>
+            <a:spLocks noGrp="1"/>
+          </p:cNvSpPr>
+          <p:nvPr>
+            <p:ph type="sldNum" sz="quarter" idx="5"/>
+          </p:nvPr>
+        </p:nvSpPr>
+        <p:spPr/>
+        <p:txBody>
+          <a:bodyPr/>
+          <a:lstStyle/>
+          <a:p>
+            <a:fld id="{B4008EB6-D09E-4580-8CD6-DDB14511944F}" type="slidenum">
+              <a:rPr lang="en-US" smtClean="0"/>
+              <a:pPr/>
+              <a:t>8</a:t>
+            </a:fld>
+            <a:endParaRPr lang="en-US"/>
+          </a:p>
+        </p:txBody>
+      </p:sp>
+    </p:spTree>
+    <p:extLst>
+      <p:ext uri="{BB962C8B-B14F-4D97-AF65-F5344CB8AC3E}">
+        <p14:creationId xmlns:p14="http://schemas.microsoft.com/office/powerpoint/2010/main" val="1968241197"/>
+      </p:ext>
+    </p:extLst>
+  </p:cSld>
+  <p:clrMapOvr>
+    <a:masterClrMapping/>
+  </p:clrMapOvr>
+</p:notes>
+</file>
+
+<file path=ppt/notesSlides/notesSlide8.xml><?xml version="1.0" encoding="utf-8"?>
+<p:notes xmlns:a="http://schemas.openxmlformats.org/drawingml/2006/main" xmlns:r="http://schemas.openxmlformats.org/officeDocument/2006/relationships" xmlns:p="http://schemas.openxmlformats.org/presentationml/2006/main">
+  <p:cSld>
+    <p:spTree>
+      <p:nvGrpSpPr>
+        <p:cNvPr id="1" name=""/>
+        <p:cNvGrpSpPr/>
+        <p:nvPr/>
+      </p:nvGrpSpPr>
+      <p:grpSpPr>
+        <a:xfrm>
+          <a:off x="0" y="0"/>
+          <a:ext cx="0" cy="0"/>
+          <a:chOff x="0" y="0"/>
+          <a:chExt cx="0" cy="0"/>
+        </a:xfrm>
+      </p:grpSpPr>
+      <p:sp>
+        <p:nvSpPr>
+          <p:cNvPr id="2" name="スライド イメージ プレースホルダー 1"/>
+          <p:cNvSpPr>
+            <a:spLocks noGrp="1" noRot="1" noChangeAspect="1"/>
+          </p:cNvSpPr>
+          <p:nvPr>
+            <p:ph type="sldImg"/>
+          </p:nvPr>
+        </p:nvSpPr>
+        <p:spPr/>
+      </p:sp>
+      <p:sp>
+        <p:nvSpPr>
+          <p:cNvPr id="3" name="ノート プレースホルダー 2"/>
+          <p:cNvSpPr>
+            <a:spLocks noGrp="1"/>
+          </p:cNvSpPr>
+          <p:nvPr>
+            <p:ph type="body" idx="1"/>
+          </p:nvPr>
+        </p:nvSpPr>
+        <p:spPr/>
+        <p:txBody>
+          <a:bodyPr/>
+          <a:lstStyle/>
+          <a:p>
+            <a:r>
+              <a:rPr kumimoji="1" lang="ja-JP" altLang="en-US"/>
+              <a:t>フィードバックをお待ちしています！</a:t>
+            </a:r>
+          </a:p>
+        </p:txBody>
+      </p:sp>
+      <p:sp>
+        <p:nvSpPr>
+          <p:cNvPr id="4" name="ヘッダー プレースホルダー 3"/>
+          <p:cNvSpPr>
+            <a:spLocks noGrp="1"/>
+          </p:cNvSpPr>
+          <p:nvPr>
+            <p:ph type="hdr" sz="quarter"/>
+          </p:nvPr>
+        </p:nvSpPr>
+        <p:spPr/>
+        <p:txBody>
+          <a:bodyPr/>
+          <a:lstStyle/>
+          <a:p>
+            <a:endParaRPr lang="en-US"/>
+          </a:p>
+        </p:txBody>
+      </p:sp>
+      <p:sp>
+        <p:nvSpPr>
+          <p:cNvPr id="5" name="フッター プレースホルダー 4"/>
+          <p:cNvSpPr>
+            <a:spLocks noGrp="1"/>
+          </p:cNvSpPr>
+          <p:nvPr>
+            <p:ph type="ftr" sz="quarter" idx="4"/>
+          </p:nvPr>
+        </p:nvSpPr>
+        <p:spPr/>
+        <p:txBody>
+          <a:bodyPr/>
+          <a:lstStyle/>
+          <a:p>
+            <a:pPr defTabSz="914099" eaLnBrk="0" hangingPunct="0"/>
+            <a:r>
+              <a:rPr lang="en-US" sz="400">
+                <a:gradFill>
+                  <a:gsLst>
+                    <a:gs pos="0">
+                      <a:prstClr val="black"/>
+                    </a:gs>
+                    <a:gs pos="100000">
+                      <a:prstClr val="black"/>
+                    </a:gs>
+                  </a:gsLst>
+                  <a:lin ang="5400000" scaled="0"/>
+                </a:gradFill>
+                <a:latin typeface="Segoe UI" pitchFamily="34" charset="0"/>
+                <a:ea typeface="Segoe UI" pitchFamily="34" charset="0"/>
+                <a:cs typeface="Segoe UI" pitchFamily="34" charset="0"/>
+              </a:rPr>
+              <a:t>© 2013 Microsoft Corporation. All rights reserved. Microsoft, Windows, and other product names are or may be registered trademarks and/or trademarks in the U.S. and/or other countries. The information herein is for informational purposes only and represents the current view of Microsoft Corporation as of the date of this presentation.  Because Microsoft must respond to changing market conditions, it should not be interpreted to be a commitment on the part of Microsoft, and Microsoft cannot guarantee the accuracy of any information provided after the date of this presentation.  MICROSOFT MAKES NO WARRANTIES, EXPRESS, IMPLIED OR STATUTORY, AS TO THE INFORMATION IN THIS PRESENTATION.</a:t>
+            </a:r>
+          </a:p>
+        </p:txBody>
+      </p:sp>
+      <p:sp>
+        <p:nvSpPr>
+          <p:cNvPr id="6" name="日付プレースホルダー 5"/>
+          <p:cNvSpPr>
+            <a:spLocks noGrp="1"/>
+          </p:cNvSpPr>
+          <p:nvPr>
+            <p:ph type="dt" idx="1"/>
+          </p:nvPr>
+        </p:nvSpPr>
+        <p:spPr/>
+        <p:txBody>
+          <a:bodyPr/>
+          <a:lstStyle/>
+          <a:p>
+            <a:fld id="{64CFA94A-519F-445C-B30C-9E76FA6A2031}" type="datetime8">
+              <a:rPr lang="en-US" smtClean="0"/>
+              <a:t>4/10/20 10:07 PM</a:t>
+            </a:fld>
+            <a:endParaRPr lang="en-US"/>
+          </a:p>
+        </p:txBody>
+      </p:sp>
+      <p:sp>
+        <p:nvSpPr>
+          <p:cNvPr id="7" name="スライド番号プレースホルダー 6"/>
+          <p:cNvSpPr>
+            <a:spLocks noGrp="1"/>
+          </p:cNvSpPr>
+          <p:nvPr>
+            <p:ph type="sldNum" sz="quarter" idx="5"/>
+          </p:nvPr>
+        </p:nvSpPr>
+        <p:spPr/>
+        <p:txBody>
+          <a:bodyPr/>
+          <a:lstStyle/>
+          <a:p>
+            <a:fld id="{B4008EB6-D09E-4580-8CD6-DDB14511944F}" type="slidenum">
+              <a:rPr lang="en-US" smtClean="0"/>
+              <a:pPr/>
+              <a:t>9</a:t>
+            </a:fld>
+            <a:endParaRPr lang="en-US"/>
+          </a:p>
+        </p:txBody>
+      </p:sp>
+    </p:spTree>
+    <p:extLst>
+      <p:ext uri="{BB962C8B-B14F-4D97-AF65-F5344CB8AC3E}">
+        <p14:creationId xmlns:p14="http://schemas.microsoft.com/office/powerpoint/2010/main" val="3330779645"/>
       </p:ext>
     </p:extLst>
   </p:cSld>
@@ -4687,8 +5404,76 @@
         </p:nvSpPr>
         <p:spPr bwMode="auto">
           <a:xfrm>
-            <a:off x="3889668" y="4192072"/>
-            <a:ext cx="5354966" cy="624626"/>
+            <a:off x="3555066" y="3438658"/>
+            <a:ext cx="1410131" cy="624626"/>
+          </a:xfrm>
+          <a:prstGeom prst="rightArrow">
+            <a:avLst/>
+          </a:prstGeom>
+          <a:ln>
+            <a:headEnd type="none" w="med" len="med"/>
+            <a:tailEnd type="none" w="med" len="med"/>
+          </a:ln>
+        </p:spPr>
+        <p:style>
+          <a:lnRef idx="2">
+            <a:schemeClr val="accent1"/>
+          </a:lnRef>
+          <a:fillRef idx="1">
+            <a:schemeClr val="lt1"/>
+          </a:fillRef>
+          <a:effectRef idx="0">
+            <a:schemeClr val="accent1"/>
+          </a:effectRef>
+          <a:fontRef idx="minor">
+            <a:schemeClr val="dk1"/>
+          </a:fontRef>
+        </p:style>
+        <p:txBody>
+          <a:bodyPr rot="0" spcFirstLastPara="0" vertOverflow="overflow" horzOverflow="overflow" vert="horz" wrap="square" lIns="182880" tIns="146304" rIns="182880" bIns="146304" numCol="1" spcCol="0" rtlCol="0" fromWordArt="0" anchor="ctr" anchorCtr="0" forceAA="0" compatLnSpc="1">
+            <a:prstTxWarp prst="textNoShape">
+              <a:avLst/>
+            </a:prstTxWarp>
+            <a:noAutofit/>
+          </a:bodyPr>
+          <a:lstStyle/>
+          <a:p>
+            <a:pPr algn="ctr" defTabSz="932472" fontAlgn="base">
+              <a:lnSpc>
+                <a:spcPct val="90000"/>
+              </a:lnSpc>
+              <a:spcBef>
+                <a:spcPct val="0"/>
+              </a:spcBef>
+              <a:spcAft>
+                <a:spcPct val="0"/>
+              </a:spcAft>
+            </a:pPr>
+            <a:endParaRPr kumimoji="1" lang="ja-JP" altLang="en-US" dirty="0">
+              <a:solidFill>
+                <a:schemeClr val="tx2"/>
+              </a:solidFill>
+              <a:cs typeface="Segoe UI" pitchFamily="34" charset="0"/>
+            </a:endParaRPr>
+          </a:p>
+        </p:txBody>
+      </p:sp>
+      <p:sp>
+        <p:nvSpPr>
+          <p:cNvPr id="11" name="右矢印 10">
+            <a:extLst>
+              <a:ext uri="{FF2B5EF4-FFF2-40B4-BE49-F238E27FC236}">
+                <a16:creationId xmlns:a16="http://schemas.microsoft.com/office/drawing/2014/main" id="{BCD804DC-2179-5041-9B6B-1210B6E9F371}"/>
+              </a:ext>
+            </a:extLst>
+          </p:cNvPr>
+          <p:cNvSpPr/>
+          <p:nvPr/>
+        </p:nvSpPr>
+        <p:spPr bwMode="auto">
+          <a:xfrm>
+            <a:off x="7988802" y="3472656"/>
+            <a:ext cx="1410131" cy="624626"/>
           </a:xfrm>
           <a:prstGeom prst="rightArrow">
             <a:avLst/>
@@ -4796,12 +5581,8 @@
           <a:lstStyle/>
           <a:p>
             <a:r>
-              <a:rPr kumimoji="1" lang="en-US" altLang="ja-JP" dirty="0"/>
-              <a:t>PowerPoint</a:t>
-            </a:r>
-            <a:r>
               <a:rPr lang="ja-JP" altLang="en-US"/>
-              <a:t> </a:t>
+              <a:t>入力ソース</a:t>
             </a:r>
             <a:r>
               <a:rPr kumimoji="1" lang="ja-JP" altLang="en-US"/>
@@ -5086,6 +5867,126 @@
           <p:cNvPr id="2" name="タイトル 1">
             <a:extLst>
               <a:ext uri="{FF2B5EF4-FFF2-40B4-BE49-F238E27FC236}">
+                <a16:creationId xmlns:a16="http://schemas.microsoft.com/office/drawing/2014/main" id="{ABD1B4B8-A929-A746-9936-6E25888A1A6B}"/>
+              </a:ext>
+            </a:extLst>
+          </p:cNvPr>
+          <p:cNvSpPr>
+            <a:spLocks noGrp="1"/>
+          </p:cNvSpPr>
+          <p:nvPr>
+            <p:ph type="title"/>
+          </p:nvPr>
+        </p:nvSpPr>
+        <p:spPr/>
+        <p:txBody>
+          <a:bodyPr/>
+          <a:lstStyle/>
+          <a:p>
+            <a:r>
+              <a:rPr kumimoji="1" lang="ja-JP" altLang="en-US"/>
+              <a:t>ノートなしのページ</a:t>
+            </a:r>
+          </a:p>
+        </p:txBody>
+      </p:sp>
+      <p:sp>
+        <p:nvSpPr>
+          <p:cNvPr id="4" name="テキスト プレースホルダー 3">
+            <a:extLst>
+              <a:ext uri="{FF2B5EF4-FFF2-40B4-BE49-F238E27FC236}">
+                <a16:creationId xmlns:a16="http://schemas.microsoft.com/office/drawing/2014/main" id="{649E205E-0FC5-DF4F-874D-49A17C5C0732}"/>
+              </a:ext>
+            </a:extLst>
+          </p:cNvPr>
+          <p:cNvSpPr>
+            <a:spLocks noGrp="1"/>
+          </p:cNvSpPr>
+          <p:nvPr>
+            <p:ph type="body" sz="quarter" idx="10"/>
+          </p:nvPr>
+        </p:nvSpPr>
+        <p:spPr/>
+        <p:txBody>
+          <a:bodyPr/>
+          <a:lstStyle/>
+          <a:p>
+            <a:r>
+              <a:rPr lang="ja-JP" altLang="en-US"/>
+              <a:t>ノートにテキストがないスライドは、無音のままで数秒で切り替わります</a:t>
+            </a:r>
+          </a:p>
+        </p:txBody>
+      </p:sp>
+      <p:sp>
+        <p:nvSpPr>
+          <p:cNvPr id="3" name="スライド番号プレースホルダー 2">
+            <a:extLst>
+              <a:ext uri="{FF2B5EF4-FFF2-40B4-BE49-F238E27FC236}">
+                <a16:creationId xmlns:a16="http://schemas.microsoft.com/office/drawing/2014/main" id="{DF79C66B-8232-1442-9441-7F3EF74E0E26}"/>
+              </a:ext>
+            </a:extLst>
+          </p:cNvPr>
+          <p:cNvSpPr>
+            <a:spLocks noGrp="1"/>
+          </p:cNvSpPr>
+          <p:nvPr>
+            <p:ph type="sldNum" sz="quarter" idx="4"/>
+          </p:nvPr>
+        </p:nvSpPr>
+        <p:spPr/>
+        <p:txBody>
+          <a:bodyPr/>
+          <a:lstStyle/>
+          <a:p>
+            <a:pPr defTabSz="932563"/>
+            <a:fld id="{B096BA3A-7840-470E-A799-24933E851897}" type="slidenum">
+              <a:rPr kumimoji="1" lang="ja-JP" altLang="en-US" smtClean="0"/>
+              <a:pPr defTabSz="932563"/>
+              <a:t>4</a:t>
+            </a:fld>
+            <a:endParaRPr kumimoji="1" lang="ja-JP" altLang="en-US"/>
+          </a:p>
+        </p:txBody>
+      </p:sp>
+    </p:spTree>
+    <p:extLst>
+      <p:ext uri="{BB962C8B-B14F-4D97-AF65-F5344CB8AC3E}">
+        <p14:creationId xmlns:p14="http://schemas.microsoft.com/office/powerpoint/2010/main" val="4108021158"/>
+      </p:ext>
+    </p:extLst>
+  </p:cSld>
+  <p:clrMapOvr>
+    <a:masterClrMapping/>
+  </p:clrMapOvr>
+  <p:transition>
+    <p:fade/>
+  </p:transition>
+</p:sld>
+</file>
+
+<file path=ppt/slides/slide5.xml><?xml version="1.0" encoding="utf-8"?>
+<p:sld xmlns:a="http://schemas.openxmlformats.org/drawingml/2006/main" xmlns:r="http://schemas.openxmlformats.org/officeDocument/2006/relationships" xmlns:p="http://schemas.openxmlformats.org/presentationml/2006/main">
+  <p:cSld>
+    <p:spTree>
+      <p:nvGrpSpPr>
+        <p:cNvPr id="1" name=""/>
+        <p:cNvGrpSpPr/>
+        <p:nvPr/>
+      </p:nvGrpSpPr>
+      <p:grpSpPr>
+        <a:xfrm>
+          <a:off x="0" y="0"/>
+          <a:ext cx="0" cy="0"/>
+          <a:chOff x="0" y="0"/>
+          <a:chExt cx="0" cy="0"/>
+        </a:xfrm>
+      </p:grpSpPr>
+      <p:sp>
+        <p:nvSpPr>
+          <p:cNvPr id="2" name="タイトル 1">
+            <a:extLst>
+              <a:ext uri="{FF2B5EF4-FFF2-40B4-BE49-F238E27FC236}">
                 <a16:creationId xmlns:a16="http://schemas.microsoft.com/office/drawing/2014/main" id="{600EB0D8-0AC9-584B-BE43-A40EE4056B1F}"/>
               </a:ext>
             </a:extLst>
@@ -5134,7 +6035,7 @@
             <a:fld id="{B096BA3A-7840-470E-A799-24933E851897}" type="slidenum">
               <a:rPr kumimoji="1" lang="ja-JP" altLang="en-US" smtClean="0"/>
               <a:pPr defTabSz="932563"/>
-              <a:t>4</a:t>
+              <a:t>5</a:t>
             </a:fld>
             <a:endParaRPr kumimoji="1" lang="ja-JP" altLang="en-US"/>
           </a:p>
@@ -5174,6 +6075,743 @@
     <p:extLst>
       <p:ext uri="{BB962C8B-B14F-4D97-AF65-F5344CB8AC3E}">
         <p14:creationId xmlns:p14="http://schemas.microsoft.com/office/powerpoint/2010/main" val="1080736849"/>
+      </p:ext>
+    </p:extLst>
+  </p:cSld>
+  <p:clrMapOvr>
+    <a:masterClrMapping/>
+  </p:clrMapOvr>
+  <p:transition>
+    <p:fade/>
+  </p:transition>
+</p:sld>
+</file>
+
+<file path=ppt/slides/slide6.xml><?xml version="1.0" encoding="utf-8"?>
+<p:sld xmlns:a="http://schemas.openxmlformats.org/drawingml/2006/main" xmlns:r="http://schemas.openxmlformats.org/officeDocument/2006/relationships" xmlns:p="http://schemas.openxmlformats.org/presentationml/2006/main">
+  <p:cSld>
+    <p:spTree>
+      <p:nvGrpSpPr>
+        <p:cNvPr id="1" name=""/>
+        <p:cNvGrpSpPr/>
+        <p:nvPr/>
+      </p:nvGrpSpPr>
+      <p:grpSpPr>
+        <a:xfrm>
+          <a:off x="0" y="0"/>
+          <a:ext cx="0" cy="0"/>
+          <a:chOff x="0" y="0"/>
+          <a:chExt cx="0" cy="0"/>
+        </a:xfrm>
+      </p:grpSpPr>
+      <p:sp>
+        <p:nvSpPr>
+          <p:cNvPr id="2" name="タイトル 1">
+            <a:extLst>
+              <a:ext uri="{FF2B5EF4-FFF2-40B4-BE49-F238E27FC236}">
+                <a16:creationId xmlns:a16="http://schemas.microsoft.com/office/drawing/2014/main" id="{5A6791F2-3494-7D4A-827A-94FA18A2CBC2}"/>
+              </a:ext>
+            </a:extLst>
+          </p:cNvPr>
+          <p:cNvSpPr>
+            <a:spLocks noGrp="1"/>
+          </p:cNvSpPr>
+          <p:nvPr>
+            <p:ph type="title"/>
+          </p:nvPr>
+        </p:nvSpPr>
+        <p:spPr/>
+        <p:txBody>
+          <a:bodyPr/>
+          <a:lstStyle/>
+          <a:p>
+            <a:r>
+              <a:rPr lang="ja-JP" altLang="en-US"/>
+              <a:t>ツール実行中の様子</a:t>
+            </a:r>
+            <a:endParaRPr kumimoji="1" lang="ja-JP" altLang="en-US"/>
+          </a:p>
+        </p:txBody>
+      </p:sp>
+      <p:sp>
+        <p:nvSpPr>
+          <p:cNvPr id="3" name="スライド番号プレースホルダー 2">
+            <a:extLst>
+              <a:ext uri="{FF2B5EF4-FFF2-40B4-BE49-F238E27FC236}">
+                <a16:creationId xmlns:a16="http://schemas.microsoft.com/office/drawing/2014/main" id="{9EB4C00E-E0DD-EA46-A934-4D10B9795A5C}"/>
+              </a:ext>
+            </a:extLst>
+          </p:cNvPr>
+          <p:cNvSpPr>
+            <a:spLocks noGrp="1"/>
+          </p:cNvSpPr>
+          <p:nvPr>
+            <p:ph type="sldNum" sz="quarter" idx="10"/>
+          </p:nvPr>
+        </p:nvSpPr>
+        <p:spPr/>
+        <p:txBody>
+          <a:bodyPr/>
+          <a:lstStyle/>
+          <a:p>
+            <a:pPr defTabSz="932563"/>
+            <a:fld id="{B096BA3A-7840-470E-A799-24933E851897}" type="slidenum">
+              <a:rPr kumimoji="1" lang="ja-JP" altLang="en-US" smtClean="0"/>
+              <a:pPr defTabSz="932563"/>
+              <a:t>6</a:t>
+            </a:fld>
+            <a:endParaRPr kumimoji="1" lang="ja-JP" altLang="en-US"/>
+          </a:p>
+        </p:txBody>
+      </p:sp>
+      <p:pic>
+        <p:nvPicPr>
+          <p:cNvPr id="6" name="図 5">
+            <a:extLst>
+              <a:ext uri="{FF2B5EF4-FFF2-40B4-BE49-F238E27FC236}">
+                <a16:creationId xmlns:a16="http://schemas.microsoft.com/office/drawing/2014/main" id="{8B110088-7E80-604E-9834-20CADE08FB9E}"/>
+              </a:ext>
+            </a:extLst>
+          </p:cNvPr>
+          <p:cNvPicPr>
+            <a:picLocks noChangeAspect="1"/>
+          </p:cNvPicPr>
+          <p:nvPr/>
+        </p:nvPicPr>
+        <p:blipFill>
+          <a:blip r:embed="rId3"/>
+          <a:stretch>
+            <a:fillRect/>
+          </a:stretch>
+        </p:blipFill>
+        <p:spPr>
+          <a:xfrm>
+            <a:off x="5041537" y="1267992"/>
+            <a:ext cx="6770177" cy="3948227"/>
+          </a:xfrm>
+          <a:prstGeom prst="rect">
+            <a:avLst/>
+          </a:prstGeom>
+        </p:spPr>
+      </p:pic>
+      <p:pic>
+        <p:nvPicPr>
+          <p:cNvPr id="5" name="図 4">
+            <a:extLst>
+              <a:ext uri="{FF2B5EF4-FFF2-40B4-BE49-F238E27FC236}">
+                <a16:creationId xmlns:a16="http://schemas.microsoft.com/office/drawing/2014/main" id="{B7A693B7-4F96-F14F-B4CE-8820E4B49F12}"/>
+              </a:ext>
+            </a:extLst>
+          </p:cNvPr>
+          <p:cNvPicPr>
+            <a:picLocks noChangeAspect="1"/>
+          </p:cNvPicPr>
+          <p:nvPr/>
+        </p:nvPicPr>
+        <p:blipFill>
+          <a:blip r:embed="rId4"/>
+          <a:stretch>
+            <a:fillRect/>
+          </a:stretch>
+        </p:blipFill>
+        <p:spPr>
+          <a:xfrm>
+            <a:off x="624761" y="2549626"/>
+            <a:ext cx="7020065" cy="3771976"/>
+          </a:xfrm>
+          <a:prstGeom prst="rect">
+            <a:avLst/>
+          </a:prstGeom>
+        </p:spPr>
+      </p:pic>
+    </p:spTree>
+    <p:extLst>
+      <p:ext uri="{BB962C8B-B14F-4D97-AF65-F5344CB8AC3E}">
+        <p14:creationId xmlns:p14="http://schemas.microsoft.com/office/powerpoint/2010/main" val="4100475200"/>
+      </p:ext>
+    </p:extLst>
+  </p:cSld>
+  <p:clrMapOvr>
+    <a:masterClrMapping/>
+  </p:clrMapOvr>
+  <p:transition>
+    <p:fade/>
+  </p:transition>
+</p:sld>
+</file>
+
+<file path=ppt/slides/slide7.xml><?xml version="1.0" encoding="utf-8"?>
+<p:sld xmlns:a="http://schemas.openxmlformats.org/drawingml/2006/main" xmlns:r="http://schemas.openxmlformats.org/officeDocument/2006/relationships" xmlns:p="http://schemas.openxmlformats.org/presentationml/2006/main">
+  <p:cSld>
+    <p:spTree>
+      <p:nvGrpSpPr>
+        <p:cNvPr id="1" name=""/>
+        <p:cNvGrpSpPr/>
+        <p:nvPr/>
+      </p:nvGrpSpPr>
+      <p:grpSpPr>
+        <a:xfrm>
+          <a:off x="0" y="0"/>
+          <a:ext cx="0" cy="0"/>
+          <a:chOff x="0" y="0"/>
+          <a:chExt cx="0" cy="0"/>
+        </a:xfrm>
+      </p:grpSpPr>
+      <p:sp>
+        <p:nvSpPr>
+          <p:cNvPr id="2" name="タイトル 1">
+            <a:extLst>
+              <a:ext uri="{FF2B5EF4-FFF2-40B4-BE49-F238E27FC236}">
+                <a16:creationId xmlns:a16="http://schemas.microsoft.com/office/drawing/2014/main" id="{45644429-BF4E-4740-A92C-77E78EAC48B3}"/>
+              </a:ext>
+            </a:extLst>
+          </p:cNvPr>
+          <p:cNvSpPr>
+            <a:spLocks noGrp="1"/>
+          </p:cNvSpPr>
+          <p:nvPr>
+            <p:ph type="title"/>
+          </p:nvPr>
+        </p:nvSpPr>
+        <p:spPr/>
+        <p:txBody>
+          <a:bodyPr/>
+          <a:lstStyle/>
+          <a:p>
+            <a:r>
+              <a:rPr kumimoji="1" lang="ja-JP" altLang="en-US"/>
+              <a:t>アニメーションは非対応です</a:t>
+            </a:r>
+          </a:p>
+        </p:txBody>
+      </p:sp>
+      <p:sp>
+        <p:nvSpPr>
+          <p:cNvPr id="3" name="テキスト プレースホルダー 2">
+            <a:extLst>
+              <a:ext uri="{FF2B5EF4-FFF2-40B4-BE49-F238E27FC236}">
+                <a16:creationId xmlns:a16="http://schemas.microsoft.com/office/drawing/2014/main" id="{B7E88F59-6899-E841-8B17-23371D19DA94}"/>
+              </a:ext>
+            </a:extLst>
+          </p:cNvPr>
+          <p:cNvSpPr>
+            <a:spLocks noGrp="1"/>
+          </p:cNvSpPr>
+          <p:nvPr>
+            <p:ph type="body" sz="quarter" idx="10"/>
+          </p:nvPr>
+        </p:nvSpPr>
+        <p:spPr/>
+        <p:txBody>
+          <a:bodyPr/>
+          <a:lstStyle/>
+          <a:p>
+            <a:endParaRPr kumimoji="1" lang="en-US" altLang="ja-JP" dirty="0"/>
+          </a:p>
+          <a:p>
+            <a:endParaRPr kumimoji="1" lang="ja-JP" altLang="en-US"/>
+          </a:p>
+        </p:txBody>
+      </p:sp>
+      <p:sp>
+        <p:nvSpPr>
+          <p:cNvPr id="4" name="スライド番号プレースホルダー 3">
+            <a:extLst>
+              <a:ext uri="{FF2B5EF4-FFF2-40B4-BE49-F238E27FC236}">
+                <a16:creationId xmlns:a16="http://schemas.microsoft.com/office/drawing/2014/main" id="{C3070FE6-C84C-3F48-938E-24707EA94A8C}"/>
+              </a:ext>
+            </a:extLst>
+          </p:cNvPr>
+          <p:cNvSpPr>
+            <a:spLocks noGrp="1"/>
+          </p:cNvSpPr>
+          <p:nvPr>
+            <p:ph type="sldNum" sz="quarter" idx="4"/>
+          </p:nvPr>
+        </p:nvSpPr>
+        <p:spPr/>
+        <p:txBody>
+          <a:bodyPr/>
+          <a:lstStyle/>
+          <a:p>
+            <a:fld id="{B096BA3A-7840-470E-A799-24933E851897}" type="slidenum">
+              <a:rPr lang="ja-JP" altLang="en-US" smtClean="0">
+                <a:solidFill>
+                  <a:srgbClr val="505050">
+                    <a:tint val="75000"/>
+                  </a:srgbClr>
+                </a:solidFill>
+              </a:rPr>
+              <a:pPr/>
+              <a:t>7</a:t>
+            </a:fld>
+            <a:endParaRPr lang="ja-JP" altLang="en-US">
+              <a:solidFill>
+                <a:srgbClr val="505050">
+                  <a:tint val="75000"/>
+                </a:srgbClr>
+              </a:solidFill>
+            </a:endParaRPr>
+          </a:p>
+        </p:txBody>
+      </p:sp>
+      <p:pic>
+        <p:nvPicPr>
+          <p:cNvPr id="5" name="図 4">
+            <a:extLst>
+              <a:ext uri="{FF2B5EF4-FFF2-40B4-BE49-F238E27FC236}">
+                <a16:creationId xmlns:a16="http://schemas.microsoft.com/office/drawing/2014/main" id="{8CAC158D-C9F9-0C4B-993C-74F29A21A39E}"/>
+              </a:ext>
+            </a:extLst>
+          </p:cNvPr>
+          <p:cNvPicPr>
+            <a:picLocks noChangeAspect="1"/>
+          </p:cNvPicPr>
+          <p:nvPr/>
+        </p:nvPicPr>
+        <p:blipFill>
+          <a:blip r:embed="rId3"/>
+          <a:stretch>
+            <a:fillRect/>
+          </a:stretch>
+        </p:blipFill>
+        <p:spPr>
+          <a:xfrm>
+            <a:off x="389507" y="1172406"/>
+            <a:ext cx="4499839" cy="4343050"/>
+          </a:xfrm>
+          <a:prstGeom prst="rect">
+            <a:avLst/>
+          </a:prstGeom>
+        </p:spPr>
+      </p:pic>
+      <p:pic>
+        <p:nvPicPr>
+          <p:cNvPr id="6" name="図 5">
+            <a:extLst>
+              <a:ext uri="{FF2B5EF4-FFF2-40B4-BE49-F238E27FC236}">
+                <a16:creationId xmlns:a16="http://schemas.microsoft.com/office/drawing/2014/main" id="{47164DB7-1235-A140-89C3-60FBFA4F6F67}"/>
+              </a:ext>
+            </a:extLst>
+          </p:cNvPr>
+          <p:cNvPicPr>
+            <a:picLocks noChangeAspect="1"/>
+          </p:cNvPicPr>
+          <p:nvPr/>
+        </p:nvPicPr>
+        <p:blipFill>
+          <a:blip r:embed="rId4"/>
+          <a:stretch>
+            <a:fillRect/>
+          </a:stretch>
+        </p:blipFill>
+        <p:spPr>
+          <a:xfrm>
+            <a:off x="5141771" y="3167156"/>
+            <a:ext cx="7020065" cy="3497315"/>
+          </a:xfrm>
+          <a:prstGeom prst="rect">
+            <a:avLst/>
+          </a:prstGeom>
+        </p:spPr>
+      </p:pic>
+      <p:sp>
+        <p:nvSpPr>
+          <p:cNvPr id="7" name="四角形吹き出し 6">
+            <a:extLst>
+              <a:ext uri="{FF2B5EF4-FFF2-40B4-BE49-F238E27FC236}">
+                <a16:creationId xmlns:a16="http://schemas.microsoft.com/office/drawing/2014/main" id="{C1FE6EF5-7738-5943-827E-F423AFE33DC5}"/>
+              </a:ext>
+            </a:extLst>
+          </p:cNvPr>
+          <p:cNvSpPr/>
+          <p:nvPr/>
+        </p:nvSpPr>
+        <p:spPr bwMode="auto">
+          <a:xfrm>
+            <a:off x="5678220" y="1212851"/>
+            <a:ext cx="2847372" cy="1177945"/>
+          </a:xfrm>
+          <a:prstGeom prst="wedgeRectCallout">
+            <a:avLst>
+              <a:gd name="adj1" fmla="val -98882"/>
+              <a:gd name="adj2" fmla="val 78960"/>
+            </a:avLst>
+          </a:prstGeom>
+          <a:ln>
+            <a:headEnd type="none" w="med" len="med"/>
+            <a:tailEnd type="none" w="med" len="med"/>
+          </a:ln>
+        </p:spPr>
+        <p:style>
+          <a:lnRef idx="2">
+            <a:schemeClr val="accent1"/>
+          </a:lnRef>
+          <a:fillRef idx="1">
+            <a:schemeClr val="lt1"/>
+          </a:fillRef>
+          <a:effectRef idx="0">
+            <a:schemeClr val="accent1"/>
+          </a:effectRef>
+          <a:fontRef idx="minor">
+            <a:schemeClr val="dk1"/>
+          </a:fontRef>
+        </p:style>
+        <p:txBody>
+          <a:bodyPr rot="0" spcFirstLastPara="0" vertOverflow="overflow" horzOverflow="overflow" vert="horz" wrap="square" lIns="182880" tIns="146304" rIns="182880" bIns="146304" numCol="1" spcCol="0" rtlCol="0" fromWordArt="0" anchor="ctr" anchorCtr="0" forceAA="0" compatLnSpc="1">
+            <a:prstTxWarp prst="textNoShape">
+              <a:avLst/>
+            </a:prstTxWarp>
+            <a:noAutofit/>
+          </a:bodyPr>
+          <a:lstStyle/>
+          <a:p>
+            <a:pPr algn="ctr" defTabSz="932472" fontAlgn="base">
+              <a:lnSpc>
+                <a:spcPct val="90000"/>
+              </a:lnSpc>
+              <a:spcBef>
+                <a:spcPct val="0"/>
+              </a:spcBef>
+              <a:spcAft>
+                <a:spcPct val="0"/>
+              </a:spcAft>
+            </a:pPr>
+            <a:r>
+              <a:rPr kumimoji="1" lang="ja-JP" altLang="en-US">
+                <a:solidFill>
+                  <a:schemeClr val="tx2"/>
+                </a:solidFill>
+                <a:cs typeface="Segoe UI" pitchFamily="34" charset="0"/>
+              </a:rPr>
+              <a:t>アニメーションタイミングを調整</a:t>
+            </a:r>
+            <a:endParaRPr kumimoji="1" lang="ja-JP" altLang="en-US" dirty="0">
+              <a:solidFill>
+                <a:schemeClr val="tx2"/>
+              </a:solidFill>
+              <a:cs typeface="Segoe UI" pitchFamily="34" charset="0"/>
+            </a:endParaRPr>
+          </a:p>
+        </p:txBody>
+      </p:sp>
+      <p:sp>
+        <p:nvSpPr>
+          <p:cNvPr id="8" name="四角形吹き出し 7">
+            <a:extLst>
+              <a:ext uri="{FF2B5EF4-FFF2-40B4-BE49-F238E27FC236}">
+                <a16:creationId xmlns:a16="http://schemas.microsoft.com/office/drawing/2014/main" id="{8B62311B-C2B5-384C-850A-4C1534A07531}"/>
+              </a:ext>
+            </a:extLst>
+          </p:cNvPr>
+          <p:cNvSpPr/>
+          <p:nvPr/>
+        </p:nvSpPr>
+        <p:spPr bwMode="auto">
+          <a:xfrm>
+            <a:off x="1721607" y="5233146"/>
+            <a:ext cx="2847372" cy="1177945"/>
+          </a:xfrm>
+          <a:prstGeom prst="wedgeRectCallout">
+            <a:avLst>
+              <a:gd name="adj1" fmla="val 78760"/>
+              <a:gd name="adj2" fmla="val 19020"/>
+            </a:avLst>
+          </a:prstGeom>
+          <a:ln>
+            <a:headEnd type="none" w="med" len="med"/>
+            <a:tailEnd type="none" w="med" len="med"/>
+          </a:ln>
+        </p:spPr>
+        <p:style>
+          <a:lnRef idx="2">
+            <a:schemeClr val="accent1"/>
+          </a:lnRef>
+          <a:fillRef idx="1">
+            <a:schemeClr val="lt1"/>
+          </a:fillRef>
+          <a:effectRef idx="0">
+            <a:schemeClr val="accent1"/>
+          </a:effectRef>
+          <a:fontRef idx="minor">
+            <a:schemeClr val="dk1"/>
+          </a:fontRef>
+        </p:style>
+        <p:txBody>
+          <a:bodyPr rot="0" spcFirstLastPara="0" vertOverflow="overflow" horzOverflow="overflow" vert="horz" wrap="square" lIns="182880" tIns="146304" rIns="182880" bIns="146304" numCol="1" spcCol="0" rtlCol="0" fromWordArt="0" anchor="ctr" anchorCtr="0" forceAA="0" compatLnSpc="1">
+            <a:prstTxWarp prst="textNoShape">
+              <a:avLst/>
+            </a:prstTxWarp>
+            <a:noAutofit/>
+          </a:bodyPr>
+          <a:lstStyle/>
+          <a:p>
+            <a:pPr algn="ctr" defTabSz="932472" fontAlgn="base">
+              <a:lnSpc>
+                <a:spcPct val="90000"/>
+              </a:lnSpc>
+              <a:spcBef>
+                <a:spcPct val="0"/>
+              </a:spcBef>
+              <a:spcAft>
+                <a:spcPct val="0"/>
+              </a:spcAft>
+            </a:pPr>
+            <a:r>
+              <a:rPr kumimoji="1" lang="ja-JP" altLang="en-US">
+                <a:solidFill>
+                  <a:schemeClr val="tx2"/>
+                </a:solidFill>
+                <a:cs typeface="Segoe UI" pitchFamily="34" charset="0"/>
+              </a:rPr>
+              <a:t>ビデオとしてエクスポート</a:t>
+            </a:r>
+            <a:endParaRPr kumimoji="1" lang="ja-JP" altLang="en-US" dirty="0">
+              <a:solidFill>
+                <a:schemeClr val="tx2"/>
+              </a:solidFill>
+              <a:cs typeface="Segoe UI" pitchFamily="34" charset="0"/>
+            </a:endParaRPr>
+          </a:p>
+        </p:txBody>
+      </p:sp>
+    </p:spTree>
+    <p:extLst>
+      <p:ext uri="{BB962C8B-B14F-4D97-AF65-F5344CB8AC3E}">
+        <p14:creationId xmlns:p14="http://schemas.microsoft.com/office/powerpoint/2010/main" val="18294045"/>
+      </p:ext>
+    </p:extLst>
+  </p:cSld>
+  <p:clrMapOvr>
+    <a:masterClrMapping/>
+  </p:clrMapOvr>
+  <p:transition>
+    <p:fade/>
+  </p:transition>
+</p:sld>
+</file>
+
+<file path=ppt/slides/slide8.xml><?xml version="1.0" encoding="utf-8"?>
+<p:sld xmlns:a="http://schemas.openxmlformats.org/drawingml/2006/main" xmlns:r="http://schemas.openxmlformats.org/officeDocument/2006/relationships" xmlns:p="http://schemas.openxmlformats.org/presentationml/2006/main">
+  <p:cSld>
+    <p:spTree>
+      <p:nvGrpSpPr>
+        <p:cNvPr id="1" name=""/>
+        <p:cNvGrpSpPr/>
+        <p:nvPr/>
+      </p:nvGrpSpPr>
+      <p:grpSpPr>
+        <a:xfrm>
+          <a:off x="0" y="0"/>
+          <a:ext cx="0" cy="0"/>
+          <a:chOff x="0" y="0"/>
+          <a:chExt cx="0" cy="0"/>
+        </a:xfrm>
+      </p:grpSpPr>
+      <p:sp>
+        <p:nvSpPr>
+          <p:cNvPr id="2" name="タイトル 1">
+            <a:extLst>
+              <a:ext uri="{FF2B5EF4-FFF2-40B4-BE49-F238E27FC236}">
+                <a16:creationId xmlns:a16="http://schemas.microsoft.com/office/drawing/2014/main" id="{8270C13F-5CC9-DC44-920A-475A8714E660}"/>
+              </a:ext>
+            </a:extLst>
+          </p:cNvPr>
+          <p:cNvSpPr>
+            <a:spLocks noGrp="1"/>
+          </p:cNvSpPr>
+          <p:nvPr>
+            <p:ph type="title"/>
+          </p:nvPr>
+        </p:nvSpPr>
+        <p:spPr/>
+        <p:txBody>
+          <a:bodyPr/>
+          <a:lstStyle/>
+          <a:p>
+            <a:r>
+              <a:rPr kumimoji="1" lang="ja-JP" altLang="en-US"/>
+              <a:t>開発および動作</a:t>
+            </a:r>
+            <a:r>
+              <a:rPr lang="ja-JP" altLang="en-US"/>
+              <a:t>確認</a:t>
+            </a:r>
+            <a:r>
+              <a:rPr kumimoji="1" lang="ja-JP" altLang="en-US"/>
+              <a:t>環境</a:t>
+            </a:r>
+          </a:p>
+        </p:txBody>
+      </p:sp>
+      <p:sp>
+        <p:nvSpPr>
+          <p:cNvPr id="4" name="テキスト プレースホルダー 3">
+            <a:extLst>
+              <a:ext uri="{FF2B5EF4-FFF2-40B4-BE49-F238E27FC236}">
+                <a16:creationId xmlns:a16="http://schemas.microsoft.com/office/drawing/2014/main" id="{CA12D5B1-4C19-4146-9C3B-4158B9B63BE8}"/>
+              </a:ext>
+            </a:extLst>
+          </p:cNvPr>
+          <p:cNvSpPr>
+            <a:spLocks noGrp="1"/>
+          </p:cNvSpPr>
+          <p:nvPr>
+            <p:ph type="body" sz="quarter" idx="10"/>
+          </p:nvPr>
+        </p:nvSpPr>
+        <p:spPr/>
+        <p:txBody>
+          <a:bodyPr/>
+          <a:lstStyle/>
+          <a:p>
+            <a:r>
+              <a:rPr lang="en-US" altLang="ja-JP" dirty="0"/>
+              <a:t>Microsoft Windows 10.0.18363 Enterprise</a:t>
+            </a:r>
+          </a:p>
+          <a:p>
+            <a:r>
+              <a:rPr lang="en-US" altLang="ja-JP" dirty="0"/>
+              <a:t>PowerShell 5.1.18362.628</a:t>
+            </a:r>
+          </a:p>
+          <a:p>
+            <a:r>
+              <a:rPr lang="en-US" altLang="ja-JP" dirty="0"/>
+              <a:t>PowerPoint for Office 365</a:t>
+            </a:r>
+            <a:endParaRPr lang="ja-JP" altLang="en-US"/>
+          </a:p>
+        </p:txBody>
+      </p:sp>
+      <p:sp>
+        <p:nvSpPr>
+          <p:cNvPr id="3" name="スライド番号プレースホルダー 2">
+            <a:extLst>
+              <a:ext uri="{FF2B5EF4-FFF2-40B4-BE49-F238E27FC236}">
+                <a16:creationId xmlns:a16="http://schemas.microsoft.com/office/drawing/2014/main" id="{35715DAF-DF33-F040-8638-49BFD7BC6B36}"/>
+              </a:ext>
+            </a:extLst>
+          </p:cNvPr>
+          <p:cNvSpPr>
+            <a:spLocks noGrp="1"/>
+          </p:cNvSpPr>
+          <p:nvPr>
+            <p:ph type="sldNum" sz="quarter" idx="4"/>
+          </p:nvPr>
+        </p:nvSpPr>
+        <p:spPr/>
+        <p:txBody>
+          <a:bodyPr/>
+          <a:lstStyle/>
+          <a:p>
+            <a:pPr defTabSz="932563"/>
+            <a:fld id="{B096BA3A-7840-470E-A799-24933E851897}" type="slidenum">
+              <a:rPr kumimoji="1" lang="ja-JP" altLang="en-US" smtClean="0"/>
+              <a:pPr defTabSz="932563"/>
+              <a:t>8</a:t>
+            </a:fld>
+            <a:endParaRPr kumimoji="1" lang="ja-JP" altLang="en-US"/>
+          </a:p>
+        </p:txBody>
+      </p:sp>
+    </p:spTree>
+    <p:extLst>
+      <p:ext uri="{BB962C8B-B14F-4D97-AF65-F5344CB8AC3E}">
+        <p14:creationId xmlns:p14="http://schemas.microsoft.com/office/powerpoint/2010/main" val="3690099650"/>
+      </p:ext>
+    </p:extLst>
+  </p:cSld>
+  <p:clrMapOvr>
+    <a:masterClrMapping/>
+  </p:clrMapOvr>
+  <p:transition>
+    <p:fade/>
+  </p:transition>
+</p:sld>
+</file>
+
+<file path=ppt/slides/slide9.xml><?xml version="1.0" encoding="utf-8"?>
+<p:sld xmlns:a="http://schemas.openxmlformats.org/drawingml/2006/main" xmlns:r="http://schemas.openxmlformats.org/officeDocument/2006/relationships" xmlns:p="http://schemas.openxmlformats.org/presentationml/2006/main">
+  <p:cSld>
+    <p:spTree>
+      <p:nvGrpSpPr>
+        <p:cNvPr id="1" name=""/>
+        <p:cNvGrpSpPr/>
+        <p:nvPr/>
+      </p:nvGrpSpPr>
+      <p:grpSpPr>
+        <a:xfrm>
+          <a:off x="0" y="0"/>
+          <a:ext cx="0" cy="0"/>
+          <a:chOff x="0" y="0"/>
+          <a:chExt cx="0" cy="0"/>
+        </a:xfrm>
+      </p:grpSpPr>
+      <p:sp>
+        <p:nvSpPr>
+          <p:cNvPr id="4" name="タイトル 3">
+            <a:extLst>
+              <a:ext uri="{FF2B5EF4-FFF2-40B4-BE49-F238E27FC236}">
+                <a16:creationId xmlns:a16="http://schemas.microsoft.com/office/drawing/2014/main" id="{C13662F0-5390-0C41-9103-C6A171CA429E}"/>
+              </a:ext>
+            </a:extLst>
+          </p:cNvPr>
+          <p:cNvSpPr>
+            <a:spLocks noGrp="1"/>
+          </p:cNvSpPr>
+          <p:nvPr>
+            <p:ph type="title"/>
+          </p:nvPr>
+        </p:nvSpPr>
+        <p:spPr/>
+        <p:txBody>
+          <a:bodyPr/>
+          <a:lstStyle/>
+          <a:p>
+            <a:r>
+              <a:rPr lang="ja-JP" altLang="en-US"/>
+              <a:t>フィードバックをお待ちしています</a:t>
+            </a:r>
+          </a:p>
+        </p:txBody>
+      </p:sp>
+      <p:sp>
+        <p:nvSpPr>
+          <p:cNvPr id="3" name="スライド番号プレースホルダー 2">
+            <a:extLst>
+              <a:ext uri="{FF2B5EF4-FFF2-40B4-BE49-F238E27FC236}">
+                <a16:creationId xmlns:a16="http://schemas.microsoft.com/office/drawing/2014/main" id="{668F2B2E-BAE0-ED4E-88CC-E34B3766BEC9}"/>
+              </a:ext>
+            </a:extLst>
+          </p:cNvPr>
+          <p:cNvSpPr>
+            <a:spLocks noGrp="1"/>
+          </p:cNvSpPr>
+          <p:nvPr>
+            <p:ph type="sldNum" sz="quarter" idx="4"/>
+          </p:nvPr>
+        </p:nvSpPr>
+        <p:spPr/>
+        <p:txBody>
+          <a:bodyPr/>
+          <a:lstStyle/>
+          <a:p>
+            <a:pPr defTabSz="932563"/>
+            <a:fld id="{B096BA3A-7840-470E-A799-24933E851897}" type="slidenum">
+              <a:rPr kumimoji="1" lang="ja-JP" altLang="en-US" smtClean="0"/>
+              <a:pPr defTabSz="932563"/>
+              <a:t>9</a:t>
+            </a:fld>
+            <a:endParaRPr kumimoji="1" lang="ja-JP" altLang="en-US"/>
+          </a:p>
+        </p:txBody>
+      </p:sp>
+    </p:spTree>
+    <p:extLst>
+      <p:ext uri="{BB962C8B-B14F-4D97-AF65-F5344CB8AC3E}">
+        <p14:creationId xmlns:p14="http://schemas.microsoft.com/office/powerpoint/2010/main" val="1933219721"/>
       </p:ext>
     </p:extLst>
   </p:cSld>

</xml_diff>